<commit_message>
splash. sis (graphic designer) will give a try too
</commit_message>
<xml_diff>
--- a/src/Presentation/SplashScreen/brachify_splash.pptx
+++ b/src/Presentation/SplashScreen/brachify_splash.pptx
@@ -6,6 +6,7 @@
   </p:sldMasterIdLst>
   <p:sldIdLst>
     <p:sldId id="256" r:id="rId2"/>
+    <p:sldId id="258" r:id="rId3"/>
   </p:sldIdLst>
   <p:sldSz cx="12192000" cy="6858000"/>
   <p:notesSz cx="6858000" cy="9144000"/>
@@ -881,8 +882,23 @@
         <a:lstStyle/>
         <a:p>
           <a:r>
-            <a:rPr lang="en-US" dirty="0" err="1" smtClean="0"/>
+            <a:rPr lang="en-US" dirty="0" err="1"/>
             <a:t>ify</a:t>
+          </a:r>
+          <a:endParaRPr lang="en-US" dirty="0"/>
+        </a:p>
+      </dgm:t>
+    </dgm:pt>
+    <dgm:pt modelId="{31BDA9D3-DDD1-4ED4-927A-42D560DF5128}" type="sibTrans" cxnId="{A9199BE9-F359-4CF5-835B-0AC1884BA60B}">
+      <dgm:prSet/>
+      <dgm:spPr/>
+      <dgm:t>
+        <a:bodyPr/>
+        <a:lstStyle/>
+        <a:p>
+          <a:r>
+            <a:rPr lang="en-US" dirty="0" err="1"/>
+            <a:t>brach</a:t>
           </a:r>
           <a:endParaRPr lang="en-US" dirty="0"/>
         </a:p>
@@ -899,21 +915,6 @@
         </a:p>
       </dgm:t>
     </dgm:pt>
-    <dgm:pt modelId="{31BDA9D3-DDD1-4ED4-927A-42D560DF5128}" type="sibTrans" cxnId="{A9199BE9-F359-4CF5-835B-0AC1884BA60B}">
-      <dgm:prSet/>
-      <dgm:spPr/>
-      <dgm:t>
-        <a:bodyPr/>
-        <a:lstStyle/>
-        <a:p>
-          <a:r>
-            <a:rPr lang="en-US" dirty="0" err="1" smtClean="0"/>
-            <a:t>brach</a:t>
-          </a:r>
-          <a:endParaRPr lang="en-US" dirty="0"/>
-        </a:p>
-      </dgm:t>
-    </dgm:pt>
     <dgm:pt modelId="{35952E6A-02FC-4822-BDE0-D907BE5B31E1}" type="pres">
       <dgm:prSet presAssocID="{A25F25C2-38E1-41F0-97B3-0FA7DF4FB05A}" presName="Name0" presStyleCnt="0">
         <dgm:presLayoutVars>
@@ -924,13 +925,6 @@
         </dgm:presLayoutVars>
       </dgm:prSet>
       <dgm:spPr/>
-      <dgm:t>
-        <a:bodyPr/>
-        <a:lstStyle/>
-        <a:p>
-          <a:endParaRPr lang="en-US"/>
-        </a:p>
-      </dgm:t>
     </dgm:pt>
     <dgm:pt modelId="{13B3C9E2-340F-4447-AE0A-54590E89D2DD}" type="pres">
       <dgm:prSet presAssocID="{EEAD3861-9B39-4DF0-98C4-33D76A4F0A5F}" presName="composite" presStyleCnt="0"/>
@@ -945,13 +939,6 @@
         </dgm:presLayoutVars>
       </dgm:prSet>
       <dgm:spPr/>
-      <dgm:t>
-        <a:bodyPr/>
-        <a:lstStyle/>
-        <a:p>
-          <a:endParaRPr lang="en-US"/>
-        </a:p>
-      </dgm:t>
     </dgm:pt>
     <dgm:pt modelId="{97BE0240-8554-42F5-A085-D591B53935FE}" type="pres">
       <dgm:prSet presAssocID="{EEAD3861-9B39-4DF0-98C4-33D76A4F0A5F}" presName="Childtext1" presStyleLbl="revTx" presStyleIdx="0" presStyleCnt="1">
@@ -974,20 +961,13 @@
     <dgm:pt modelId="{9D84B986-5963-4F4F-927B-C6793CD3218F}" type="pres">
       <dgm:prSet presAssocID="{31BDA9D3-DDD1-4ED4-927A-42D560DF5128}" presName="Accent1Text" presStyleLbl="node1" presStyleIdx="1" presStyleCnt="2"/>
       <dgm:spPr/>
-      <dgm:t>
-        <a:bodyPr/>
-        <a:lstStyle/>
-        <a:p>
-          <a:endParaRPr lang="en-US"/>
-        </a:p>
-      </dgm:t>
     </dgm:pt>
   </dgm:ptLst>
   <dgm:cxnLst>
+    <dgm:cxn modelId="{C61BD52A-8BA2-485C-99B9-873F2A7F5322}" type="presOf" srcId="{31BDA9D3-DDD1-4ED4-927A-42D560DF5128}" destId="{9D84B986-5963-4F4F-927B-C6793CD3218F}" srcOrd="0" destOrd="0" presId="urn:microsoft.com/office/officeart/2008/layout/AlternatingHexagons"/>
     <dgm:cxn modelId="{94282A73-4021-4FD5-B40C-D83384A20668}" type="presOf" srcId="{EEAD3861-9B39-4DF0-98C4-33D76A4F0A5F}" destId="{BFAC245D-9679-47D4-B140-6BC35B29B98E}" srcOrd="0" destOrd="0" presId="urn:microsoft.com/office/officeart/2008/layout/AlternatingHexagons"/>
+    <dgm:cxn modelId="{5EFE68AA-1763-45E9-AC0C-37BB134CFF44}" type="presOf" srcId="{A25F25C2-38E1-41F0-97B3-0FA7DF4FB05A}" destId="{35952E6A-02FC-4822-BDE0-D907BE5B31E1}" srcOrd="0" destOrd="0" presId="urn:microsoft.com/office/officeart/2008/layout/AlternatingHexagons"/>
     <dgm:cxn modelId="{A9199BE9-F359-4CF5-835B-0AC1884BA60B}" srcId="{A25F25C2-38E1-41F0-97B3-0FA7DF4FB05A}" destId="{EEAD3861-9B39-4DF0-98C4-33D76A4F0A5F}" srcOrd="0" destOrd="0" parTransId="{53783E57-2A80-454B-BAF0-F8420233D0DA}" sibTransId="{31BDA9D3-DDD1-4ED4-927A-42D560DF5128}"/>
-    <dgm:cxn modelId="{C61BD52A-8BA2-485C-99B9-873F2A7F5322}" type="presOf" srcId="{31BDA9D3-DDD1-4ED4-927A-42D560DF5128}" destId="{9D84B986-5963-4F4F-927B-C6793CD3218F}" srcOrd="0" destOrd="0" presId="urn:microsoft.com/office/officeart/2008/layout/AlternatingHexagons"/>
-    <dgm:cxn modelId="{5EFE68AA-1763-45E9-AC0C-37BB134CFF44}" type="presOf" srcId="{A25F25C2-38E1-41F0-97B3-0FA7DF4FB05A}" destId="{35952E6A-02FC-4822-BDE0-D907BE5B31E1}" srcOrd="0" destOrd="0" presId="urn:microsoft.com/office/officeart/2008/layout/AlternatingHexagons"/>
     <dgm:cxn modelId="{337395E4-89D3-43D3-90EB-95ABF5FFC7B7}" type="presParOf" srcId="{35952E6A-02FC-4822-BDE0-D907BE5B31E1}" destId="{13B3C9E2-340F-4447-AE0A-54590E89D2DD}" srcOrd="0" destOrd="0" presId="urn:microsoft.com/office/officeart/2008/layout/AlternatingHexagons"/>
     <dgm:cxn modelId="{F7E0FB72-DF59-4CE3-B802-9EC5C9601204}" type="presParOf" srcId="{13B3C9E2-340F-4447-AE0A-54590E89D2DD}" destId="{BFAC245D-9679-47D4-B140-6BC35B29B98E}" srcOrd="0" destOrd="0" presId="urn:microsoft.com/office/officeart/2008/layout/AlternatingHexagons"/>
     <dgm:cxn modelId="{9FCF0FE7-D45B-4AA8-97E8-F156BB632FFA}" type="presParOf" srcId="{13B3C9E2-340F-4447-AE0A-54590E89D2DD}" destId="{97BE0240-8554-42F5-A085-D591B53935FE}" srcOrd="1" destOrd="0" presId="urn:microsoft.com/office/officeart/2008/layout/AlternatingHexagons"/>
@@ -1071,7 +1051,7 @@
         </a:bodyPr>
         <a:lstStyle/>
         <a:p>
-          <a:pPr lvl="0" algn="ctr" defTabSz="2889250">
+          <a:pPr marL="0" lvl="0" indent="0" algn="ctr" defTabSz="2889250">
             <a:lnSpc>
               <a:spcPct val="90000"/>
             </a:lnSpc>
@@ -1081,9 +1061,10 @@
             <a:spcAft>
               <a:spcPct val="35000"/>
             </a:spcAft>
+            <a:buNone/>
           </a:pPr>
           <a:r>
-            <a:rPr lang="en-US" sz="6500" kern="1200" dirty="0" err="1" smtClean="0"/>
+            <a:rPr lang="en-US" sz="6500" kern="1200" dirty="0" err="1"/>
             <a:t>ify</a:t>
           </a:r>
           <a:endParaRPr lang="en-US" sz="6500" kern="1200" dirty="0"/>
@@ -1184,7 +1165,7 @@
         </a:bodyPr>
         <a:lstStyle/>
         <a:p>
-          <a:pPr lvl="0" algn="ctr" defTabSz="1600200">
+          <a:pPr marL="0" lvl="0" indent="0" algn="ctr" defTabSz="1600200">
             <a:lnSpc>
               <a:spcPct val="90000"/>
             </a:lnSpc>
@@ -1194,9 +1175,10 @@
             <a:spcAft>
               <a:spcPct val="35000"/>
             </a:spcAft>
+            <a:buNone/>
           </a:pPr>
           <a:r>
-            <a:rPr lang="en-US" sz="3600" kern="1200" dirty="0" err="1" smtClean="0"/>
+            <a:rPr lang="en-US" sz="3600" kern="1200" dirty="0" err="1"/>
             <a:t>brach</a:t>
           </a:r>
           <a:endParaRPr lang="en-US" sz="3600" kern="1200" dirty="0"/>
@@ -2642,7 +2624,7 @@
           </a:lstStyle>
           <a:p>
             <a:r>
-              <a:rPr lang="en-US" smtClean="0"/>
+              <a:rPr lang="en-US"/>
               <a:t>Click to edit Master title style</a:t>
             </a:r>
             <a:endParaRPr lang="en-CA"/>
@@ -2707,7 +2689,7 @@
           </a:lstStyle>
           <a:p>
             <a:r>
-              <a:rPr lang="en-US" smtClean="0"/>
+              <a:rPr lang="en-US"/>
               <a:t>Click to edit Master subtitle style</a:t>
             </a:r>
             <a:endParaRPr lang="en-CA"/>
@@ -2731,7 +2713,7 @@
           <a:p>
             <a:fld id="{0D039BA5-E807-4E9D-A087-F89B6691E655}" type="datetimeFigureOut">
               <a:rPr lang="en-CA" smtClean="0"/>
-              <a:t>30-Oct-2023</a:t>
+              <a:t>2023-11-02</a:t>
             </a:fld>
             <a:endParaRPr lang="en-CA"/>
           </a:p>
@@ -2825,7 +2807,7 @@
           <a:lstStyle/>
           <a:p>
             <a:r>
-              <a:rPr lang="en-US" smtClean="0"/>
+              <a:rPr lang="en-US"/>
               <a:t>Click to edit Master title style</a:t>
             </a:r>
             <a:endParaRPr lang="en-CA"/>
@@ -2849,35 +2831,35 @@
           <a:p>
             <a:pPr lvl="0"/>
             <a:r>
-              <a:rPr lang="en-US" smtClean="0"/>
+              <a:rPr lang="en-US"/>
               <a:t>Edit Master text styles</a:t>
             </a:r>
           </a:p>
           <a:p>
             <a:pPr lvl="1"/>
             <a:r>
-              <a:rPr lang="en-US" smtClean="0"/>
+              <a:rPr lang="en-US"/>
               <a:t>Second level</a:t>
             </a:r>
           </a:p>
           <a:p>
             <a:pPr lvl="2"/>
             <a:r>
-              <a:rPr lang="en-US" smtClean="0"/>
+              <a:rPr lang="en-US"/>
               <a:t>Third level</a:t>
             </a:r>
           </a:p>
           <a:p>
             <a:pPr lvl="3"/>
             <a:r>
-              <a:rPr lang="en-US" smtClean="0"/>
+              <a:rPr lang="en-US"/>
               <a:t>Fourth level</a:t>
             </a:r>
           </a:p>
           <a:p>
             <a:pPr lvl="4"/>
             <a:r>
-              <a:rPr lang="en-US" smtClean="0"/>
+              <a:rPr lang="en-US"/>
               <a:t>Fifth level</a:t>
             </a:r>
             <a:endParaRPr lang="en-CA"/>
@@ -2901,7 +2883,7 @@
           <a:p>
             <a:fld id="{0D039BA5-E807-4E9D-A087-F89B6691E655}" type="datetimeFigureOut">
               <a:rPr lang="en-CA" smtClean="0"/>
-              <a:t>30-Oct-2023</a:t>
+              <a:t>2023-11-02</a:t>
             </a:fld>
             <a:endParaRPr lang="en-CA"/>
           </a:p>
@@ -3000,7 +2982,7 @@
           <a:lstStyle/>
           <a:p>
             <a:r>
-              <a:rPr lang="en-US" smtClean="0"/>
+              <a:rPr lang="en-US"/>
               <a:t>Click to edit Master title style</a:t>
             </a:r>
             <a:endParaRPr lang="en-CA"/>
@@ -3029,35 +3011,35 @@
           <a:p>
             <a:pPr lvl="0"/>
             <a:r>
-              <a:rPr lang="en-US" smtClean="0"/>
+              <a:rPr lang="en-US"/>
               <a:t>Edit Master text styles</a:t>
             </a:r>
           </a:p>
           <a:p>
             <a:pPr lvl="1"/>
             <a:r>
-              <a:rPr lang="en-US" smtClean="0"/>
+              <a:rPr lang="en-US"/>
               <a:t>Second level</a:t>
             </a:r>
           </a:p>
           <a:p>
             <a:pPr lvl="2"/>
             <a:r>
-              <a:rPr lang="en-US" smtClean="0"/>
+              <a:rPr lang="en-US"/>
               <a:t>Third level</a:t>
             </a:r>
           </a:p>
           <a:p>
             <a:pPr lvl="3"/>
             <a:r>
-              <a:rPr lang="en-US" smtClean="0"/>
+              <a:rPr lang="en-US"/>
               <a:t>Fourth level</a:t>
             </a:r>
           </a:p>
           <a:p>
             <a:pPr lvl="4"/>
             <a:r>
-              <a:rPr lang="en-US" smtClean="0"/>
+              <a:rPr lang="en-US"/>
               <a:t>Fifth level</a:t>
             </a:r>
             <a:endParaRPr lang="en-CA"/>
@@ -3081,7 +3063,7 @@
           <a:p>
             <a:fld id="{0D039BA5-E807-4E9D-A087-F89B6691E655}" type="datetimeFigureOut">
               <a:rPr lang="en-CA" smtClean="0"/>
-              <a:t>30-Oct-2023</a:t>
+              <a:t>2023-11-02</a:t>
             </a:fld>
             <a:endParaRPr lang="en-CA"/>
           </a:p>
@@ -3175,7 +3157,7 @@
           <a:lstStyle/>
           <a:p>
             <a:r>
-              <a:rPr lang="en-US" smtClean="0"/>
+              <a:rPr lang="en-US"/>
               <a:t>Click to edit Master title style</a:t>
             </a:r>
             <a:endParaRPr lang="en-CA"/>
@@ -3199,35 +3181,35 @@
           <a:p>
             <a:pPr lvl="0"/>
             <a:r>
-              <a:rPr lang="en-US" smtClean="0"/>
+              <a:rPr lang="en-US"/>
               <a:t>Edit Master text styles</a:t>
             </a:r>
           </a:p>
           <a:p>
             <a:pPr lvl="1"/>
             <a:r>
-              <a:rPr lang="en-US" smtClean="0"/>
+              <a:rPr lang="en-US"/>
               <a:t>Second level</a:t>
             </a:r>
           </a:p>
           <a:p>
             <a:pPr lvl="2"/>
             <a:r>
-              <a:rPr lang="en-US" smtClean="0"/>
+              <a:rPr lang="en-US"/>
               <a:t>Third level</a:t>
             </a:r>
           </a:p>
           <a:p>
             <a:pPr lvl="3"/>
             <a:r>
-              <a:rPr lang="en-US" smtClean="0"/>
+              <a:rPr lang="en-US"/>
               <a:t>Fourth level</a:t>
             </a:r>
           </a:p>
           <a:p>
             <a:pPr lvl="4"/>
             <a:r>
-              <a:rPr lang="en-US" smtClean="0"/>
+              <a:rPr lang="en-US"/>
               <a:t>Fifth level</a:t>
             </a:r>
             <a:endParaRPr lang="en-CA"/>
@@ -3251,7 +3233,7 @@
           <a:p>
             <a:fld id="{0D039BA5-E807-4E9D-A087-F89B6691E655}" type="datetimeFigureOut">
               <a:rPr lang="en-CA" smtClean="0"/>
-              <a:t>30-Oct-2023</a:t>
+              <a:t>2023-11-02</a:t>
             </a:fld>
             <a:endParaRPr lang="en-CA"/>
           </a:p>
@@ -3354,7 +3336,7 @@
           </a:lstStyle>
           <a:p>
             <a:r>
-              <a:rPr lang="en-US" smtClean="0"/>
+              <a:rPr lang="en-US"/>
               <a:t>Click to edit Master title style</a:t>
             </a:r>
             <a:endParaRPr lang="en-CA"/>
@@ -3474,7 +3456,7 @@
           <a:p>
             <a:pPr lvl="0"/>
             <a:r>
-              <a:rPr lang="en-US" smtClean="0"/>
+              <a:rPr lang="en-US"/>
               <a:t>Edit Master text styles</a:t>
             </a:r>
           </a:p>
@@ -3497,7 +3479,7 @@
           <a:p>
             <a:fld id="{0D039BA5-E807-4E9D-A087-F89B6691E655}" type="datetimeFigureOut">
               <a:rPr lang="en-CA" smtClean="0"/>
-              <a:t>30-Oct-2023</a:t>
+              <a:t>2023-11-02</a:t>
             </a:fld>
             <a:endParaRPr lang="en-CA"/>
           </a:p>
@@ -3591,7 +3573,7 @@
           <a:lstStyle/>
           <a:p>
             <a:r>
-              <a:rPr lang="en-US" smtClean="0"/>
+              <a:rPr lang="en-US"/>
               <a:t>Click to edit Master title style</a:t>
             </a:r>
             <a:endParaRPr lang="en-CA"/>
@@ -3620,35 +3602,35 @@
           <a:p>
             <a:pPr lvl="0"/>
             <a:r>
-              <a:rPr lang="en-US" smtClean="0"/>
+              <a:rPr lang="en-US"/>
               <a:t>Edit Master text styles</a:t>
             </a:r>
           </a:p>
           <a:p>
             <a:pPr lvl="1"/>
             <a:r>
-              <a:rPr lang="en-US" smtClean="0"/>
+              <a:rPr lang="en-US"/>
               <a:t>Second level</a:t>
             </a:r>
           </a:p>
           <a:p>
             <a:pPr lvl="2"/>
             <a:r>
-              <a:rPr lang="en-US" smtClean="0"/>
+              <a:rPr lang="en-US"/>
               <a:t>Third level</a:t>
             </a:r>
           </a:p>
           <a:p>
             <a:pPr lvl="3"/>
             <a:r>
-              <a:rPr lang="en-US" smtClean="0"/>
+              <a:rPr lang="en-US"/>
               <a:t>Fourth level</a:t>
             </a:r>
           </a:p>
           <a:p>
             <a:pPr lvl="4"/>
             <a:r>
-              <a:rPr lang="en-US" smtClean="0"/>
+              <a:rPr lang="en-US"/>
               <a:t>Fifth level</a:t>
             </a:r>
             <a:endParaRPr lang="en-CA"/>
@@ -3677,35 +3659,35 @@
           <a:p>
             <a:pPr lvl="0"/>
             <a:r>
-              <a:rPr lang="en-US" smtClean="0"/>
+              <a:rPr lang="en-US"/>
               <a:t>Edit Master text styles</a:t>
             </a:r>
           </a:p>
           <a:p>
             <a:pPr lvl="1"/>
             <a:r>
-              <a:rPr lang="en-US" smtClean="0"/>
+              <a:rPr lang="en-US"/>
               <a:t>Second level</a:t>
             </a:r>
           </a:p>
           <a:p>
             <a:pPr lvl="2"/>
             <a:r>
-              <a:rPr lang="en-US" smtClean="0"/>
+              <a:rPr lang="en-US"/>
               <a:t>Third level</a:t>
             </a:r>
           </a:p>
           <a:p>
             <a:pPr lvl="3"/>
             <a:r>
-              <a:rPr lang="en-US" smtClean="0"/>
+              <a:rPr lang="en-US"/>
               <a:t>Fourth level</a:t>
             </a:r>
           </a:p>
           <a:p>
             <a:pPr lvl="4"/>
             <a:r>
-              <a:rPr lang="en-US" smtClean="0"/>
+              <a:rPr lang="en-US"/>
               <a:t>Fifth level</a:t>
             </a:r>
             <a:endParaRPr lang="en-CA"/>
@@ -3729,7 +3711,7 @@
           <a:p>
             <a:fld id="{0D039BA5-E807-4E9D-A087-F89B6691E655}" type="datetimeFigureOut">
               <a:rPr lang="en-CA" smtClean="0"/>
-              <a:t>30-Oct-2023</a:t>
+              <a:t>2023-11-02</a:t>
             </a:fld>
             <a:endParaRPr lang="en-CA"/>
           </a:p>
@@ -3828,7 +3810,7 @@
           <a:lstStyle/>
           <a:p>
             <a:r>
-              <a:rPr lang="en-US" smtClean="0"/>
+              <a:rPr lang="en-US"/>
               <a:t>Click to edit Master title style</a:t>
             </a:r>
             <a:endParaRPr lang="en-CA"/>
@@ -3894,7 +3876,7 @@
           <a:p>
             <a:pPr lvl="0"/>
             <a:r>
-              <a:rPr lang="en-US" smtClean="0"/>
+              <a:rPr lang="en-US"/>
               <a:t>Edit Master text styles</a:t>
             </a:r>
           </a:p>
@@ -3922,35 +3904,35 @@
           <a:p>
             <a:pPr lvl="0"/>
             <a:r>
-              <a:rPr lang="en-US" smtClean="0"/>
+              <a:rPr lang="en-US"/>
               <a:t>Edit Master text styles</a:t>
             </a:r>
           </a:p>
           <a:p>
             <a:pPr lvl="1"/>
             <a:r>
-              <a:rPr lang="en-US" smtClean="0"/>
+              <a:rPr lang="en-US"/>
               <a:t>Second level</a:t>
             </a:r>
           </a:p>
           <a:p>
             <a:pPr lvl="2"/>
             <a:r>
-              <a:rPr lang="en-US" smtClean="0"/>
+              <a:rPr lang="en-US"/>
               <a:t>Third level</a:t>
             </a:r>
           </a:p>
           <a:p>
             <a:pPr lvl="3"/>
             <a:r>
-              <a:rPr lang="en-US" smtClean="0"/>
+              <a:rPr lang="en-US"/>
               <a:t>Fourth level</a:t>
             </a:r>
           </a:p>
           <a:p>
             <a:pPr lvl="4"/>
             <a:r>
-              <a:rPr lang="en-US" smtClean="0"/>
+              <a:rPr lang="en-US"/>
               <a:t>Fifth level</a:t>
             </a:r>
             <a:endParaRPr lang="en-CA"/>
@@ -4016,7 +3998,7 @@
           <a:p>
             <a:pPr lvl="0"/>
             <a:r>
-              <a:rPr lang="en-US" smtClean="0"/>
+              <a:rPr lang="en-US"/>
               <a:t>Edit Master text styles</a:t>
             </a:r>
           </a:p>
@@ -4044,35 +4026,35 @@
           <a:p>
             <a:pPr lvl="0"/>
             <a:r>
-              <a:rPr lang="en-US" smtClean="0"/>
+              <a:rPr lang="en-US"/>
               <a:t>Edit Master text styles</a:t>
             </a:r>
           </a:p>
           <a:p>
             <a:pPr lvl="1"/>
             <a:r>
-              <a:rPr lang="en-US" smtClean="0"/>
+              <a:rPr lang="en-US"/>
               <a:t>Second level</a:t>
             </a:r>
           </a:p>
           <a:p>
             <a:pPr lvl="2"/>
             <a:r>
-              <a:rPr lang="en-US" smtClean="0"/>
+              <a:rPr lang="en-US"/>
               <a:t>Third level</a:t>
             </a:r>
           </a:p>
           <a:p>
             <a:pPr lvl="3"/>
             <a:r>
-              <a:rPr lang="en-US" smtClean="0"/>
+              <a:rPr lang="en-US"/>
               <a:t>Fourth level</a:t>
             </a:r>
           </a:p>
           <a:p>
             <a:pPr lvl="4"/>
             <a:r>
-              <a:rPr lang="en-US" smtClean="0"/>
+              <a:rPr lang="en-US"/>
               <a:t>Fifth level</a:t>
             </a:r>
             <a:endParaRPr lang="en-CA"/>
@@ -4096,7 +4078,7 @@
           <a:p>
             <a:fld id="{0D039BA5-E807-4E9D-A087-F89B6691E655}" type="datetimeFigureOut">
               <a:rPr lang="en-CA" smtClean="0"/>
-              <a:t>30-Oct-2023</a:t>
+              <a:t>2023-11-02</a:t>
             </a:fld>
             <a:endParaRPr lang="en-CA"/>
           </a:p>
@@ -4190,7 +4172,7 @@
           <a:lstStyle/>
           <a:p>
             <a:r>
-              <a:rPr lang="en-US" smtClean="0"/>
+              <a:rPr lang="en-US"/>
               <a:t>Click to edit Master title style</a:t>
             </a:r>
             <a:endParaRPr lang="en-CA"/>
@@ -4214,7 +4196,7 @@
           <a:p>
             <a:fld id="{0D039BA5-E807-4E9D-A087-F89B6691E655}" type="datetimeFigureOut">
               <a:rPr lang="en-CA" smtClean="0"/>
-              <a:t>30-Oct-2023</a:t>
+              <a:t>2023-11-02</a:t>
             </a:fld>
             <a:endParaRPr lang="en-CA"/>
           </a:p>
@@ -4309,7 +4291,7 @@
           <a:p>
             <a:fld id="{0D039BA5-E807-4E9D-A087-F89B6691E655}" type="datetimeFigureOut">
               <a:rPr lang="en-CA" smtClean="0"/>
-              <a:t>30-Oct-2023</a:t>
+              <a:t>2023-11-02</a:t>
             </a:fld>
             <a:endParaRPr lang="en-CA"/>
           </a:p>
@@ -4412,7 +4394,7 @@
           </a:lstStyle>
           <a:p>
             <a:r>
-              <a:rPr lang="en-US" smtClean="0"/>
+              <a:rPr lang="en-US"/>
               <a:t>Click to edit Master title style</a:t>
             </a:r>
             <a:endParaRPr lang="en-CA"/>
@@ -4469,35 +4451,35 @@
           <a:p>
             <a:pPr lvl="0"/>
             <a:r>
-              <a:rPr lang="en-US" smtClean="0"/>
+              <a:rPr lang="en-US"/>
               <a:t>Edit Master text styles</a:t>
             </a:r>
           </a:p>
           <a:p>
             <a:pPr lvl="1"/>
             <a:r>
-              <a:rPr lang="en-US" smtClean="0"/>
+              <a:rPr lang="en-US"/>
               <a:t>Second level</a:t>
             </a:r>
           </a:p>
           <a:p>
             <a:pPr lvl="2"/>
             <a:r>
-              <a:rPr lang="en-US" smtClean="0"/>
+              <a:rPr lang="en-US"/>
               <a:t>Third level</a:t>
             </a:r>
           </a:p>
           <a:p>
             <a:pPr lvl="3"/>
             <a:r>
-              <a:rPr lang="en-US" smtClean="0"/>
+              <a:rPr lang="en-US"/>
               <a:t>Fourth level</a:t>
             </a:r>
           </a:p>
           <a:p>
             <a:pPr lvl="4"/>
             <a:r>
-              <a:rPr lang="en-US" smtClean="0"/>
+              <a:rPr lang="en-US"/>
               <a:t>Fifth level</a:t>
             </a:r>
             <a:endParaRPr lang="en-CA"/>
@@ -4563,7 +4545,7 @@
           <a:p>
             <a:pPr lvl="0"/>
             <a:r>
-              <a:rPr lang="en-US" smtClean="0"/>
+              <a:rPr lang="en-US"/>
               <a:t>Edit Master text styles</a:t>
             </a:r>
           </a:p>
@@ -4586,7 +4568,7 @@
           <a:p>
             <a:fld id="{0D039BA5-E807-4E9D-A087-F89B6691E655}" type="datetimeFigureOut">
               <a:rPr lang="en-CA" smtClean="0"/>
-              <a:t>30-Oct-2023</a:t>
+              <a:t>2023-11-02</a:t>
             </a:fld>
             <a:endParaRPr lang="en-CA"/>
           </a:p>
@@ -4689,7 +4671,7 @@
           </a:lstStyle>
           <a:p>
             <a:r>
-              <a:rPr lang="en-US" smtClean="0"/>
+              <a:rPr lang="en-US"/>
               <a:t>Click to edit Master title style</a:t>
             </a:r>
             <a:endParaRPr lang="en-CA"/>
@@ -4816,7 +4798,7 @@
           <a:p>
             <a:pPr lvl="0"/>
             <a:r>
-              <a:rPr lang="en-US" smtClean="0"/>
+              <a:rPr lang="en-US"/>
               <a:t>Edit Master text styles</a:t>
             </a:r>
           </a:p>
@@ -4839,7 +4821,7 @@
           <a:p>
             <a:fld id="{0D039BA5-E807-4E9D-A087-F89B6691E655}" type="datetimeFigureOut">
               <a:rPr lang="en-CA" smtClean="0"/>
-              <a:t>30-Oct-2023</a:t>
+              <a:t>2023-11-02</a:t>
             </a:fld>
             <a:endParaRPr lang="en-CA"/>
           </a:p>
@@ -4948,7 +4930,7 @@
           <a:lstStyle/>
           <a:p>
             <a:r>
-              <a:rPr lang="en-US" smtClean="0"/>
+              <a:rPr lang="en-US"/>
               <a:t>Click to edit Master title style</a:t>
             </a:r>
             <a:endParaRPr lang="en-CA"/>
@@ -4982,35 +4964,35 @@
           <a:p>
             <a:pPr lvl="0"/>
             <a:r>
-              <a:rPr lang="en-US" smtClean="0"/>
+              <a:rPr lang="en-US"/>
               <a:t>Edit Master text styles</a:t>
             </a:r>
           </a:p>
           <a:p>
             <a:pPr lvl="1"/>
             <a:r>
-              <a:rPr lang="en-US" smtClean="0"/>
+              <a:rPr lang="en-US"/>
               <a:t>Second level</a:t>
             </a:r>
           </a:p>
           <a:p>
             <a:pPr lvl="2"/>
             <a:r>
-              <a:rPr lang="en-US" smtClean="0"/>
+              <a:rPr lang="en-US"/>
               <a:t>Third level</a:t>
             </a:r>
           </a:p>
           <a:p>
             <a:pPr lvl="3"/>
             <a:r>
-              <a:rPr lang="en-US" smtClean="0"/>
+              <a:rPr lang="en-US"/>
               <a:t>Fourth level</a:t>
             </a:r>
           </a:p>
           <a:p>
             <a:pPr lvl="4"/>
             <a:r>
-              <a:rPr lang="en-US" smtClean="0"/>
+              <a:rPr lang="en-US"/>
               <a:t>Fifth level</a:t>
             </a:r>
             <a:endParaRPr lang="en-CA"/>
@@ -5052,7 +5034,7 @@
           <a:p>
             <a:fld id="{0D039BA5-E807-4E9D-A087-F89B6691E655}" type="datetimeFigureOut">
               <a:rPr lang="en-CA" smtClean="0"/>
-              <a:t>30-Oct-2023</a:t>
+              <a:t>2023-11-02</a:t>
             </a:fld>
             <a:endParaRPr lang="en-CA"/>
           </a:p>
@@ -5580,7 +5562,7 @@
           <a:lstStyle/>
           <a:p>
             <a:pPr algn="ctr"/>
-            <a:endParaRPr lang="en-CA"/>
+            <a:endParaRPr lang="en-CA" dirty="0"/>
           </a:p>
         </p:txBody>
       </p:sp>
@@ -6016,47 +5998,8 @@
               <a:rPr lang="en-CA" sz="2400" dirty="0">
                 <a:latin typeface="Bahnschrift SemiLight" panose="020B0502040204020203" pitchFamily="34" charset="0"/>
               </a:rPr>
-              <a:t>b</a:t>
+              <a:t>by nsmela and michael kudla</a:t>
             </a:r>
-            <a:r>
-              <a:rPr lang="en-CA" sz="2400" dirty="0" smtClean="0">
-                <a:latin typeface="Bahnschrift SemiLight" panose="020B0502040204020203" pitchFamily="34" charset="0"/>
-              </a:rPr>
-              <a:t>y </a:t>
-            </a:r>
-            <a:r>
-              <a:rPr lang="en-CA" sz="2400" dirty="0" err="1" smtClean="0">
-                <a:latin typeface="Bahnschrift SemiLight" panose="020B0502040204020203" pitchFamily="34" charset="0"/>
-              </a:rPr>
-              <a:t>nsmela</a:t>
-            </a:r>
-            <a:r>
-              <a:rPr lang="en-CA" sz="2400" dirty="0" smtClean="0">
-                <a:latin typeface="Bahnschrift SemiLight" panose="020B0502040204020203" pitchFamily="34" charset="0"/>
-              </a:rPr>
-              <a:t> and </a:t>
-            </a:r>
-            <a:r>
-              <a:rPr lang="en-CA" sz="2400" dirty="0" err="1" smtClean="0">
-                <a:latin typeface="Bahnschrift SemiLight" panose="020B0502040204020203" pitchFamily="34" charset="0"/>
-              </a:rPr>
-              <a:t>michael</a:t>
-            </a:r>
-            <a:r>
-              <a:rPr lang="en-CA" sz="2400" dirty="0" smtClean="0">
-                <a:latin typeface="Bahnschrift SemiLight" panose="020B0502040204020203" pitchFamily="34" charset="0"/>
-              </a:rPr>
-              <a:t> </a:t>
-            </a:r>
-            <a:r>
-              <a:rPr lang="en-CA" sz="2400" dirty="0" err="1" smtClean="0">
-                <a:latin typeface="Bahnschrift SemiLight" panose="020B0502040204020203" pitchFamily="34" charset="0"/>
-              </a:rPr>
-              <a:t>kudla</a:t>
-            </a:r>
-            <a:endParaRPr lang="en-CA" sz="2400" dirty="0">
-              <a:latin typeface="Bahnschrift SemiLight" panose="020B0502040204020203" pitchFamily="34" charset="0"/>
-            </a:endParaRPr>
           </a:p>
         </p:txBody>
       </p:sp>
@@ -6064,6 +6007,663 @@
     <p:extLst>
       <p:ext uri="{BB962C8B-B14F-4D97-AF65-F5344CB8AC3E}">
         <p14:creationId xmlns:p14="http://schemas.microsoft.com/office/powerpoint/2010/main" val="2142519403"/>
+      </p:ext>
+    </p:extLst>
+  </p:cSld>
+  <p:clrMapOvr>
+    <a:masterClrMapping/>
+  </p:clrMapOvr>
+</p:sld>
+</file>
+
+<file path=ppt/slides/slide2.xml><?xml version="1.0" encoding="utf-8"?>
+<p:sld xmlns:a="http://schemas.openxmlformats.org/drawingml/2006/main" xmlns:r="http://schemas.openxmlformats.org/officeDocument/2006/relationships" xmlns:p="http://schemas.openxmlformats.org/presentationml/2006/main">
+  <p:cSld>
+    <p:bg>
+      <p:bgPr>
+        <a:solidFill>
+          <a:schemeClr val="accent1">
+            <a:lumMod val="50000"/>
+          </a:schemeClr>
+        </a:solidFill>
+        <a:effectLst/>
+      </p:bgPr>
+    </p:bg>
+    <p:spTree>
+      <p:nvGrpSpPr>
+        <p:cNvPr id="1" name=""/>
+        <p:cNvGrpSpPr/>
+        <p:nvPr/>
+      </p:nvGrpSpPr>
+      <p:grpSpPr>
+        <a:xfrm>
+          <a:off x="0" y="0"/>
+          <a:ext cx="0" cy="0"/>
+          <a:chOff x="0" y="0"/>
+          <a:chExt cx="0" cy="0"/>
+        </a:xfrm>
+      </p:grpSpPr>
+      <p:sp>
+        <p:nvSpPr>
+          <p:cNvPr id="11" name="Freeform 10"/>
+          <p:cNvSpPr/>
+          <p:nvPr/>
+        </p:nvSpPr>
+        <p:spPr>
+          <a:xfrm flipV="1">
+            <a:off x="-3798241" y="-683251"/>
+            <a:ext cx="23366429" cy="10770322"/>
+          </a:xfrm>
+          <a:custGeom>
+            <a:avLst/>
+            <a:gdLst>
+              <a:gd name="connsiteX0" fmla="*/ 20866000 w 21515451"/>
+              <a:gd name="connsiteY0" fmla="*/ 6492112 h 7256613"/>
+              <a:gd name="connsiteX1" fmla="*/ 9224985 w 21515451"/>
+              <a:gd name="connsiteY1" fmla="*/ 6861389 h 7256613"/>
+              <a:gd name="connsiteX2" fmla="*/ 45816 w 21515451"/>
+              <a:gd name="connsiteY2" fmla="*/ 2764174 h 7256613"/>
+              <a:gd name="connsiteX3" fmla="*/ 6253185 w 21515451"/>
+              <a:gd name="connsiteY3" fmla="*/ 38558 h 7256613"/>
+              <a:gd name="connsiteX4" fmla="*/ 18562416 w 21515451"/>
+              <a:gd name="connsiteY4" fmla="*/ 1533250 h 7256613"/>
+              <a:gd name="connsiteX5" fmla="*/ 20866000 w 21515451"/>
+              <a:gd name="connsiteY5" fmla="*/ 6492112 h 7256613"/>
+            </a:gdLst>
+            <a:ahLst/>
+            <a:cxnLst>
+              <a:cxn ang="0">
+                <a:pos x="connsiteX0" y="connsiteY0"/>
+              </a:cxn>
+              <a:cxn ang="0">
+                <a:pos x="connsiteX1" y="connsiteY1"/>
+              </a:cxn>
+              <a:cxn ang="0">
+                <a:pos x="connsiteX2" y="connsiteY2"/>
+              </a:cxn>
+              <a:cxn ang="0">
+                <a:pos x="connsiteX3" y="connsiteY3"/>
+              </a:cxn>
+              <a:cxn ang="0">
+                <a:pos x="connsiteX4" y="connsiteY4"/>
+              </a:cxn>
+              <a:cxn ang="0">
+                <a:pos x="connsiteX5" y="connsiteY5"/>
+              </a:cxn>
+            </a:cxnLst>
+            <a:rect l="l" t="t" r="r" b="b"/>
+            <a:pathLst>
+              <a:path w="21515451" h="7256613">
+                <a:moveTo>
+                  <a:pt x="20866000" y="6492112"/>
+                </a:moveTo>
+                <a:cubicBezTo>
+                  <a:pt x="19309762" y="7380135"/>
+                  <a:pt x="12695016" y="7482712"/>
+                  <a:pt x="9224985" y="6861389"/>
+                </a:cubicBezTo>
+                <a:cubicBezTo>
+                  <a:pt x="5754954" y="6240066"/>
+                  <a:pt x="541116" y="3901312"/>
+                  <a:pt x="45816" y="2764174"/>
+                </a:cubicBezTo>
+                <a:cubicBezTo>
+                  <a:pt x="-449484" y="1627036"/>
+                  <a:pt x="3167085" y="243712"/>
+                  <a:pt x="6253185" y="38558"/>
+                </a:cubicBezTo>
+                <a:cubicBezTo>
+                  <a:pt x="9339285" y="-166596"/>
+                  <a:pt x="16129878" y="463519"/>
+                  <a:pt x="18562416" y="1533250"/>
+                </a:cubicBezTo>
+                <a:cubicBezTo>
+                  <a:pt x="20994954" y="2602981"/>
+                  <a:pt x="22422238" y="5604089"/>
+                  <a:pt x="20866000" y="6492112"/>
+                </a:cubicBezTo>
+                <a:close/>
+              </a:path>
+            </a:pathLst>
+          </a:custGeom>
+          <a:gradFill flip="none" rotWithShape="1">
+            <a:gsLst>
+              <a:gs pos="0">
+                <a:schemeClr val="accent1">
+                  <a:lumMod val="75000"/>
+                </a:schemeClr>
+              </a:gs>
+              <a:gs pos="59000">
+                <a:schemeClr val="bg1">
+                  <a:alpha val="0"/>
+                </a:schemeClr>
+              </a:gs>
+            </a:gsLst>
+            <a:lin ang="18900000" scaled="1"/>
+            <a:tileRect/>
+          </a:gradFill>
+          <a:ln>
+            <a:solidFill>
+              <a:schemeClr val="accent1">
+                <a:lumMod val="75000"/>
+              </a:schemeClr>
+            </a:solidFill>
+          </a:ln>
+        </p:spPr>
+        <p:style>
+          <a:lnRef idx="2">
+            <a:schemeClr val="accent1">
+              <a:shade val="50000"/>
+            </a:schemeClr>
+          </a:lnRef>
+          <a:fillRef idx="1">
+            <a:schemeClr val="accent1"/>
+          </a:fillRef>
+          <a:effectRef idx="0">
+            <a:schemeClr val="accent1"/>
+          </a:effectRef>
+          <a:fontRef idx="minor">
+            <a:schemeClr val="lt1"/>
+          </a:fontRef>
+        </p:style>
+        <p:txBody>
+          <a:bodyPr rtlCol="0" anchor="ctr"/>
+          <a:lstStyle/>
+          <a:p>
+            <a:pPr algn="ctr"/>
+            <a:endParaRPr lang="en-CA" dirty="0"/>
+          </a:p>
+        </p:txBody>
+      </p:sp>
+      <p:sp>
+        <p:nvSpPr>
+          <p:cNvPr id="7" name="Freeform 6"/>
+          <p:cNvSpPr/>
+          <p:nvPr/>
+        </p:nvSpPr>
+        <p:spPr>
+          <a:xfrm>
+            <a:off x="-532435" y="3196130"/>
+            <a:ext cx="15750909" cy="6907326"/>
+          </a:xfrm>
+          <a:custGeom>
+            <a:avLst/>
+            <a:gdLst>
+              <a:gd name="connsiteX0" fmla="*/ 12641218 w 14921646"/>
+              <a:gd name="connsiteY0" fmla="*/ 528699 h 6907326"/>
+              <a:gd name="connsiteX1" fmla="*/ 5537034 w 14921646"/>
+              <a:gd name="connsiteY1" fmla="*/ 634207 h 6907326"/>
+              <a:gd name="connsiteX2" fmla="*/ 33049 w 14921646"/>
+              <a:gd name="connsiteY2" fmla="*/ 5909591 h 6907326"/>
+              <a:gd name="connsiteX3" fmla="*/ 8104387 w 14921646"/>
+              <a:gd name="connsiteY3" fmla="*/ 6806407 h 6907326"/>
+              <a:gd name="connsiteX4" fmla="*/ 14698618 w 14921646"/>
+              <a:gd name="connsiteY4" fmla="*/ 4555576 h 6907326"/>
+              <a:gd name="connsiteX5" fmla="*/ 12641218 w 14921646"/>
+              <a:gd name="connsiteY5" fmla="*/ 528699 h 6907326"/>
+            </a:gdLst>
+            <a:ahLst/>
+            <a:cxnLst>
+              <a:cxn ang="0">
+                <a:pos x="connsiteX0" y="connsiteY0"/>
+              </a:cxn>
+              <a:cxn ang="0">
+                <a:pos x="connsiteX1" y="connsiteY1"/>
+              </a:cxn>
+              <a:cxn ang="0">
+                <a:pos x="connsiteX2" y="connsiteY2"/>
+              </a:cxn>
+              <a:cxn ang="0">
+                <a:pos x="connsiteX3" y="connsiteY3"/>
+              </a:cxn>
+              <a:cxn ang="0">
+                <a:pos x="connsiteX4" y="connsiteY4"/>
+              </a:cxn>
+              <a:cxn ang="0">
+                <a:pos x="connsiteX5" y="connsiteY5"/>
+              </a:cxn>
+            </a:cxnLst>
+            <a:rect l="l" t="t" r="r" b="b"/>
+            <a:pathLst>
+              <a:path w="14921646" h="6907326">
+                <a:moveTo>
+                  <a:pt x="12641218" y="528699"/>
+                </a:moveTo>
+                <a:cubicBezTo>
+                  <a:pt x="11114287" y="-124862"/>
+                  <a:pt x="7638395" y="-262608"/>
+                  <a:pt x="5537034" y="634207"/>
+                </a:cubicBezTo>
+                <a:cubicBezTo>
+                  <a:pt x="3435673" y="1531022"/>
+                  <a:pt x="-394843" y="4880891"/>
+                  <a:pt x="33049" y="5909591"/>
+                </a:cubicBezTo>
+                <a:cubicBezTo>
+                  <a:pt x="460941" y="6938291"/>
+                  <a:pt x="5660126" y="7032076"/>
+                  <a:pt x="8104387" y="6806407"/>
+                </a:cubicBezTo>
+                <a:cubicBezTo>
+                  <a:pt x="10548648" y="6580738"/>
+                  <a:pt x="13942480" y="5598930"/>
+                  <a:pt x="14698618" y="4555576"/>
+                </a:cubicBezTo>
+                <a:cubicBezTo>
+                  <a:pt x="15454757" y="3512222"/>
+                  <a:pt x="14168149" y="1182260"/>
+                  <a:pt x="12641218" y="528699"/>
+                </a:cubicBezTo>
+                <a:close/>
+              </a:path>
+            </a:pathLst>
+          </a:custGeom>
+          <a:gradFill flip="none" rotWithShape="1">
+            <a:gsLst>
+              <a:gs pos="0">
+                <a:schemeClr val="accent1">
+                  <a:lumMod val="20000"/>
+                  <a:lumOff val="80000"/>
+                </a:schemeClr>
+              </a:gs>
+              <a:gs pos="100000">
+                <a:schemeClr val="bg1">
+                  <a:alpha val="0"/>
+                </a:schemeClr>
+              </a:gs>
+            </a:gsLst>
+            <a:lin ang="2700000" scaled="1"/>
+            <a:tileRect/>
+          </a:gradFill>
+          <a:ln>
+            <a:solidFill>
+              <a:schemeClr val="accent1">
+                <a:lumMod val="20000"/>
+                <a:lumOff val="80000"/>
+              </a:schemeClr>
+            </a:solidFill>
+          </a:ln>
+        </p:spPr>
+        <p:style>
+          <a:lnRef idx="2">
+            <a:schemeClr val="accent1">
+              <a:shade val="50000"/>
+            </a:schemeClr>
+          </a:lnRef>
+          <a:fillRef idx="1">
+            <a:schemeClr val="accent1"/>
+          </a:fillRef>
+          <a:effectRef idx="0">
+            <a:schemeClr val="accent1"/>
+          </a:effectRef>
+          <a:fontRef idx="minor">
+            <a:schemeClr val="lt1"/>
+          </a:fontRef>
+        </p:style>
+        <p:txBody>
+          <a:bodyPr rtlCol="0" anchor="ctr"/>
+          <a:lstStyle/>
+          <a:p>
+            <a:pPr algn="ctr"/>
+            <a:endParaRPr lang="en-CA"/>
+          </a:p>
+        </p:txBody>
+      </p:sp>
+      <p:sp>
+        <p:nvSpPr>
+          <p:cNvPr id="8" name="Freeform 7"/>
+          <p:cNvSpPr/>
+          <p:nvPr/>
+        </p:nvSpPr>
+        <p:spPr>
+          <a:xfrm>
+            <a:off x="-1674281" y="1967144"/>
+            <a:ext cx="19927111" cy="6907326"/>
+          </a:xfrm>
+          <a:custGeom>
+            <a:avLst/>
+            <a:gdLst>
+              <a:gd name="connsiteX0" fmla="*/ 12641218 w 14921646"/>
+              <a:gd name="connsiteY0" fmla="*/ 528699 h 6907326"/>
+              <a:gd name="connsiteX1" fmla="*/ 5537034 w 14921646"/>
+              <a:gd name="connsiteY1" fmla="*/ 634207 h 6907326"/>
+              <a:gd name="connsiteX2" fmla="*/ 33049 w 14921646"/>
+              <a:gd name="connsiteY2" fmla="*/ 5909591 h 6907326"/>
+              <a:gd name="connsiteX3" fmla="*/ 8104387 w 14921646"/>
+              <a:gd name="connsiteY3" fmla="*/ 6806407 h 6907326"/>
+              <a:gd name="connsiteX4" fmla="*/ 14698618 w 14921646"/>
+              <a:gd name="connsiteY4" fmla="*/ 4555576 h 6907326"/>
+              <a:gd name="connsiteX5" fmla="*/ 12641218 w 14921646"/>
+              <a:gd name="connsiteY5" fmla="*/ 528699 h 6907326"/>
+            </a:gdLst>
+            <a:ahLst/>
+            <a:cxnLst>
+              <a:cxn ang="0">
+                <a:pos x="connsiteX0" y="connsiteY0"/>
+              </a:cxn>
+              <a:cxn ang="0">
+                <a:pos x="connsiteX1" y="connsiteY1"/>
+              </a:cxn>
+              <a:cxn ang="0">
+                <a:pos x="connsiteX2" y="connsiteY2"/>
+              </a:cxn>
+              <a:cxn ang="0">
+                <a:pos x="connsiteX3" y="connsiteY3"/>
+              </a:cxn>
+              <a:cxn ang="0">
+                <a:pos x="connsiteX4" y="connsiteY4"/>
+              </a:cxn>
+              <a:cxn ang="0">
+                <a:pos x="connsiteX5" y="connsiteY5"/>
+              </a:cxn>
+            </a:cxnLst>
+            <a:rect l="l" t="t" r="r" b="b"/>
+            <a:pathLst>
+              <a:path w="14921646" h="6907326">
+                <a:moveTo>
+                  <a:pt x="12641218" y="528699"/>
+                </a:moveTo>
+                <a:cubicBezTo>
+                  <a:pt x="11114287" y="-124862"/>
+                  <a:pt x="7638395" y="-262608"/>
+                  <a:pt x="5537034" y="634207"/>
+                </a:cubicBezTo>
+                <a:cubicBezTo>
+                  <a:pt x="3435673" y="1531022"/>
+                  <a:pt x="-394843" y="4880891"/>
+                  <a:pt x="33049" y="5909591"/>
+                </a:cubicBezTo>
+                <a:cubicBezTo>
+                  <a:pt x="460941" y="6938291"/>
+                  <a:pt x="5660126" y="7032076"/>
+                  <a:pt x="8104387" y="6806407"/>
+                </a:cubicBezTo>
+                <a:cubicBezTo>
+                  <a:pt x="10548648" y="6580738"/>
+                  <a:pt x="13942480" y="5598930"/>
+                  <a:pt x="14698618" y="4555576"/>
+                </a:cubicBezTo>
+                <a:cubicBezTo>
+                  <a:pt x="15454757" y="3512222"/>
+                  <a:pt x="14168149" y="1182260"/>
+                  <a:pt x="12641218" y="528699"/>
+                </a:cubicBezTo>
+                <a:close/>
+              </a:path>
+            </a:pathLst>
+          </a:custGeom>
+          <a:gradFill flip="none" rotWithShape="1">
+            <a:gsLst>
+              <a:gs pos="0">
+                <a:schemeClr val="accent1">
+                  <a:lumMod val="40000"/>
+                  <a:lumOff val="60000"/>
+                </a:schemeClr>
+              </a:gs>
+              <a:gs pos="100000">
+                <a:schemeClr val="bg1">
+                  <a:alpha val="0"/>
+                </a:schemeClr>
+              </a:gs>
+            </a:gsLst>
+            <a:lin ang="2700000" scaled="1"/>
+            <a:tileRect/>
+          </a:gradFill>
+          <a:ln>
+            <a:solidFill>
+              <a:schemeClr val="accent1">
+                <a:lumMod val="40000"/>
+                <a:lumOff val="60000"/>
+              </a:schemeClr>
+            </a:solidFill>
+          </a:ln>
+        </p:spPr>
+        <p:style>
+          <a:lnRef idx="2">
+            <a:schemeClr val="accent1">
+              <a:shade val="50000"/>
+            </a:schemeClr>
+          </a:lnRef>
+          <a:fillRef idx="1">
+            <a:schemeClr val="accent1"/>
+          </a:fillRef>
+          <a:effectRef idx="0">
+            <a:schemeClr val="accent1"/>
+          </a:effectRef>
+          <a:fontRef idx="minor">
+            <a:schemeClr val="lt1"/>
+          </a:fontRef>
+        </p:style>
+        <p:txBody>
+          <a:bodyPr rtlCol="0" anchor="ctr"/>
+          <a:lstStyle/>
+          <a:p>
+            <a:pPr algn="ctr"/>
+            <a:endParaRPr lang="en-CA"/>
+          </a:p>
+        </p:txBody>
+      </p:sp>
+      <p:sp>
+        <p:nvSpPr>
+          <p:cNvPr id="9" name="Freeform 8"/>
+          <p:cNvSpPr/>
+          <p:nvPr/>
+        </p:nvSpPr>
+        <p:spPr>
+          <a:xfrm>
+            <a:off x="-2851567" y="981233"/>
+            <a:ext cx="20191169" cy="6907326"/>
+          </a:xfrm>
+          <a:custGeom>
+            <a:avLst/>
+            <a:gdLst>
+              <a:gd name="connsiteX0" fmla="*/ 12641218 w 14921646"/>
+              <a:gd name="connsiteY0" fmla="*/ 528699 h 6907326"/>
+              <a:gd name="connsiteX1" fmla="*/ 5537034 w 14921646"/>
+              <a:gd name="connsiteY1" fmla="*/ 634207 h 6907326"/>
+              <a:gd name="connsiteX2" fmla="*/ 33049 w 14921646"/>
+              <a:gd name="connsiteY2" fmla="*/ 5909591 h 6907326"/>
+              <a:gd name="connsiteX3" fmla="*/ 8104387 w 14921646"/>
+              <a:gd name="connsiteY3" fmla="*/ 6806407 h 6907326"/>
+              <a:gd name="connsiteX4" fmla="*/ 14698618 w 14921646"/>
+              <a:gd name="connsiteY4" fmla="*/ 4555576 h 6907326"/>
+              <a:gd name="connsiteX5" fmla="*/ 12641218 w 14921646"/>
+              <a:gd name="connsiteY5" fmla="*/ 528699 h 6907326"/>
+            </a:gdLst>
+            <a:ahLst/>
+            <a:cxnLst>
+              <a:cxn ang="0">
+                <a:pos x="connsiteX0" y="connsiteY0"/>
+              </a:cxn>
+              <a:cxn ang="0">
+                <a:pos x="connsiteX1" y="connsiteY1"/>
+              </a:cxn>
+              <a:cxn ang="0">
+                <a:pos x="connsiteX2" y="connsiteY2"/>
+              </a:cxn>
+              <a:cxn ang="0">
+                <a:pos x="connsiteX3" y="connsiteY3"/>
+              </a:cxn>
+              <a:cxn ang="0">
+                <a:pos x="connsiteX4" y="connsiteY4"/>
+              </a:cxn>
+              <a:cxn ang="0">
+                <a:pos x="connsiteX5" y="connsiteY5"/>
+              </a:cxn>
+            </a:cxnLst>
+            <a:rect l="l" t="t" r="r" b="b"/>
+            <a:pathLst>
+              <a:path w="14921646" h="6907326">
+                <a:moveTo>
+                  <a:pt x="12641218" y="528699"/>
+                </a:moveTo>
+                <a:cubicBezTo>
+                  <a:pt x="11114287" y="-124862"/>
+                  <a:pt x="7638395" y="-262608"/>
+                  <a:pt x="5537034" y="634207"/>
+                </a:cubicBezTo>
+                <a:cubicBezTo>
+                  <a:pt x="3435673" y="1531022"/>
+                  <a:pt x="-394843" y="4880891"/>
+                  <a:pt x="33049" y="5909591"/>
+                </a:cubicBezTo>
+                <a:cubicBezTo>
+                  <a:pt x="460941" y="6938291"/>
+                  <a:pt x="5660126" y="7032076"/>
+                  <a:pt x="8104387" y="6806407"/>
+                </a:cubicBezTo>
+                <a:cubicBezTo>
+                  <a:pt x="10548648" y="6580738"/>
+                  <a:pt x="13942480" y="5598930"/>
+                  <a:pt x="14698618" y="4555576"/>
+                </a:cubicBezTo>
+                <a:cubicBezTo>
+                  <a:pt x="15454757" y="3512222"/>
+                  <a:pt x="14168149" y="1182260"/>
+                  <a:pt x="12641218" y="528699"/>
+                </a:cubicBezTo>
+                <a:close/>
+              </a:path>
+            </a:pathLst>
+          </a:custGeom>
+          <a:gradFill flip="none" rotWithShape="1">
+            <a:gsLst>
+              <a:gs pos="0">
+                <a:schemeClr val="accent1">
+                  <a:lumMod val="60000"/>
+                  <a:lumOff val="40000"/>
+                </a:schemeClr>
+              </a:gs>
+              <a:gs pos="100000">
+                <a:schemeClr val="bg1">
+                  <a:alpha val="0"/>
+                </a:schemeClr>
+              </a:gs>
+            </a:gsLst>
+            <a:lin ang="2700000" scaled="1"/>
+            <a:tileRect/>
+          </a:gradFill>
+          <a:ln>
+            <a:solidFill>
+              <a:schemeClr val="accent1">
+                <a:lumMod val="60000"/>
+                <a:lumOff val="40000"/>
+              </a:schemeClr>
+            </a:solidFill>
+          </a:ln>
+        </p:spPr>
+        <p:style>
+          <a:lnRef idx="2">
+            <a:schemeClr val="accent1">
+              <a:shade val="50000"/>
+            </a:schemeClr>
+          </a:lnRef>
+          <a:fillRef idx="1">
+            <a:schemeClr val="accent1"/>
+          </a:fillRef>
+          <a:effectRef idx="0">
+            <a:schemeClr val="accent1"/>
+          </a:effectRef>
+          <a:fontRef idx="minor">
+            <a:schemeClr val="lt1"/>
+          </a:fontRef>
+        </p:style>
+        <p:txBody>
+          <a:bodyPr rtlCol="0" anchor="ctr"/>
+          <a:lstStyle/>
+          <a:p>
+            <a:pPr algn="ctr"/>
+            <a:endParaRPr lang="en-CA"/>
+          </a:p>
+        </p:txBody>
+      </p:sp>
+      <p:sp>
+        <p:nvSpPr>
+          <p:cNvPr id="2" name="TextBox 1"/>
+          <p:cNvSpPr txBox="1"/>
+          <p:nvPr/>
+        </p:nvSpPr>
+        <p:spPr>
+          <a:xfrm>
+            <a:off x="8199120" y="6380285"/>
+            <a:ext cx="3992881" cy="461665"/>
+          </a:xfrm>
+          <a:prstGeom prst="rect">
+            <a:avLst/>
+          </a:prstGeom>
+          <a:noFill/>
+        </p:spPr>
+        <p:txBody>
+          <a:bodyPr wrap="square" rtlCol="0">
+            <a:spAutoFit/>
+          </a:bodyPr>
+          <a:lstStyle/>
+          <a:p>
+            <a:r>
+              <a:rPr lang="en-CA" sz="2400" dirty="0">
+                <a:solidFill>
+                  <a:schemeClr val="accent1">
+                    <a:lumMod val="50000"/>
+                  </a:schemeClr>
+                </a:solidFill>
+              </a:rPr>
+              <a:t>by nsmela and michael kudla</a:t>
+            </a:r>
+          </a:p>
+        </p:txBody>
+      </p:sp>
+      <p:sp>
+        <p:nvSpPr>
+          <p:cNvPr id="3" name="TextBox 2">
+            <a:extLst>
+              <a:ext uri="{FF2B5EF4-FFF2-40B4-BE49-F238E27FC236}">
+                <a16:creationId xmlns:a16="http://schemas.microsoft.com/office/drawing/2014/main" id="{F4F20540-DD56-EC1E-54E3-7C9D31568FC0}"/>
+              </a:ext>
+            </a:extLst>
+          </p:cNvPr>
+          <p:cNvSpPr txBox="1"/>
+          <p:nvPr/>
+        </p:nvSpPr>
+        <p:spPr>
+          <a:xfrm>
+            <a:off x="6226495" y="3978383"/>
+            <a:ext cx="6207622" cy="1569660"/>
+          </a:xfrm>
+          <a:prstGeom prst="rect">
+            <a:avLst/>
+          </a:prstGeom>
+          <a:noFill/>
+        </p:spPr>
+        <p:txBody>
+          <a:bodyPr wrap="square" rtlCol="0">
+            <a:spAutoFit/>
+          </a:bodyPr>
+          <a:lstStyle/>
+          <a:p>
+            <a:r>
+              <a:rPr lang="en-CA" sz="9600" i="1" dirty="0">
+                <a:solidFill>
+                  <a:schemeClr val="accent1">
+                    <a:lumMod val="50000"/>
+                  </a:schemeClr>
+                </a:solidFill>
+              </a:rPr>
+              <a:t>brachify</a:t>
+            </a:r>
+            <a:endParaRPr lang="en-CA" sz="3600" i="1" dirty="0">
+              <a:solidFill>
+                <a:schemeClr val="accent1">
+                  <a:lumMod val="50000"/>
+                </a:schemeClr>
+              </a:solidFill>
+            </a:endParaRPr>
+          </a:p>
+        </p:txBody>
+      </p:sp>
+    </p:spTree>
+    <p:extLst>
+      <p:ext uri="{BB962C8B-B14F-4D97-AF65-F5344CB8AC3E}">
+        <p14:creationId xmlns:p14="http://schemas.microsoft.com/office/powerpoint/2010/main" val="2059831485"/>
       </p:ext>
     </p:extLst>
   </p:cSld>

</xml_diff>